<commit_message>
Rubric, and final clean up
</commit_message>
<xml_diff>
--- a/Tekle_Amanuel_Capstone2_PowerPoint.pptx
+++ b/Tekle_Amanuel_Capstone2_PowerPoint.pptx
@@ -230,7 +230,7 @@
           <a:p>
             <a:fld id="{500BE106-9E8F-5E4B-8372-DEE3BFEF72D4}" type="datetimeFigureOut">
               <a:rPr lang="en-US" smtClean="0"/>
-              <a:t>6/8/2022</a:t>
+              <a:t>6/9/2022</a:t>
             </a:fld>
             <a:endParaRPr lang="en-US" dirty="0"/>
           </a:p>
@@ -407,7 +407,7 @@
           <a:p>
             <a:fld id="{78C78EF0-0DF0-8442-8A08-5681612D9C6F}" type="datetimeFigureOut">
               <a:rPr lang="en-US" smtClean="0"/>
-              <a:t>6/8/2022</a:t>
+              <a:t>6/9/2022</a:t>
             </a:fld>
             <a:endParaRPr lang="en-US" dirty="0"/>
           </a:p>
@@ -14073,6 +14073,12 @@
             <a:r>
               <a:rPr lang="en-US" dirty="0"/>
               <a:t>Python Integration</a:t>
+            </a:r>
+          </a:p>
+          <a:p>
+            <a:r>
+              <a:rPr lang="en-US" dirty="0"/>
+              <a:t>Navigation buttons</a:t>
             </a:r>
           </a:p>
           <a:p>
@@ -15237,6 +15243,15 @@
 </file>
 
 <file path=customXml/item2.xml><?xml version="1.0" encoding="utf-8"?>
+<?mso-contentType ?>
+<FormTemplates xmlns="http://schemas.microsoft.com/sharepoint/v3/contenttype/forms">
+  <Display>DocumentLibraryForm</Display>
+  <Edit>DocumentLibraryForm</Edit>
+  <New>DocumentLibraryForm</New>
+</FormTemplates>
+</file>
+
+<file path=customXml/item3.xml><?xml version="1.0" encoding="utf-8"?>
 <ct:contentTypeSchema xmlns:ct="http://schemas.microsoft.com/office/2006/metadata/contentType" xmlns:ma="http://schemas.microsoft.com/office/2006/metadata/properties/metaAttributes" ct:_="" ma:_="" ma:contentTypeName="Document" ma:contentTypeID="0x010100FEF7458C51E57141848015B90E19E3FF" ma:contentTypeVersion="15" ma:contentTypeDescription="Create a new document." ma:contentTypeScope="" ma:versionID="12fb0db276e8be4984a0823ffe929ad1">
   <xsd:schema xmlns:xsd="http://www.w3.org/2001/XMLSchema" xmlns:xs="http://www.w3.org/2001/XMLSchema" xmlns:p="http://schemas.microsoft.com/office/2006/metadata/properties" xmlns:ns2="d2a9f884-c2eb-4182-8d97-b2c1069a1e77" xmlns:ns3="ad1dcd44-2c79-421e-996d-e07b6b6a06b7" xmlns:ns4="872877ae-a410-445f-835b-653367d2e530" targetNamespace="http://schemas.microsoft.com/office/2006/metadata/properties" ma:root="true" ma:fieldsID="7f400bb4bb80b6365717ab8834d3c4dc" ns2:_="" ns3:_="" ns4:_="">
     <xsd:import namespace="d2a9f884-c2eb-4182-8d97-b2c1069a1e77"/>
@@ -15472,15 +15487,6 @@
 </ct:contentTypeSchema>
 </file>
 
-<file path=customXml/item3.xml><?xml version="1.0" encoding="utf-8"?>
-<?mso-contentType ?>
-<FormTemplates xmlns="http://schemas.microsoft.com/sharepoint/v3/contenttype/forms">
-  <Display>DocumentLibraryForm</Display>
-  <Edit>DocumentLibraryForm</Edit>
-  <New>DocumentLibraryForm</New>
-</FormTemplates>
-</file>
-
 <file path=customXml/itemProps1.xml><?xml version="1.0" encoding="utf-8"?>
 <ds:datastoreItem xmlns:ds="http://schemas.openxmlformats.org/officeDocument/2006/customXml" ds:itemID="{E3F0252B-B6E9-4221-B01E-0247E154DC26}">
   <ds:schemaRefs>
@@ -15500,6 +15506,14 @@
 </file>
 
 <file path=customXml/itemProps2.xml><?xml version="1.0" encoding="utf-8"?>
+<ds:datastoreItem xmlns:ds="http://schemas.openxmlformats.org/officeDocument/2006/customXml" ds:itemID="{F11117D9-2152-408D-8EA9-A138D8484626}">
+  <ds:schemaRefs>
+    <ds:schemaRef ds:uri="http://schemas.microsoft.com/sharepoint/v3/contenttype/forms"/>
+  </ds:schemaRefs>
+</ds:datastoreItem>
+</file>
+
+<file path=customXml/itemProps3.xml><?xml version="1.0" encoding="utf-8"?>
 <ds:datastoreItem xmlns:ds="http://schemas.openxmlformats.org/officeDocument/2006/customXml" ds:itemID="{466406F6-04EA-49D7-891D-0329DF4DFC24}">
   <ds:schemaRefs>
     <ds:schemaRef ds:uri="http://schemas.microsoft.com/office/2006/metadata/contentType"/>
@@ -15517,12 +15531,4 @@
     <ds:schemaRef ds:uri="http://schemas.microsoft.com/internal/obd"/>
   </ds:schemaRefs>
 </ds:datastoreItem>
-</file>
-
-<file path=customXml/itemProps3.xml><?xml version="1.0" encoding="utf-8"?>
-<ds:datastoreItem xmlns:ds="http://schemas.openxmlformats.org/officeDocument/2006/customXml" ds:itemID="{F11117D9-2152-408D-8EA9-A138D8484626}">
-  <ds:schemaRefs>
-    <ds:schemaRef ds:uri="http://schemas.microsoft.com/sharepoint/v3/contenttype/forms"/>
-  </ds:schemaRefs>
-</ds:datastoreItem>
 </file>
</xml_diff>